<commit_message>
Update apresentação do programa
</commit_message>
<xml_diff>
--- a/Exame_T3_G4/Apresentacao_do_Programa.pptx
+++ b/Exame_T3_G4/Apresentacao_do_Programa.pptx
@@ -285,6 +285,11 @@
       </a:defRPr>
     </a:lvl9pPr>
   </p:defaultTextStyle>
+  <p:extLst>
+    <p:ext uri="{EFAFB233-063F-42B5-8137-9DF3F51BA10A}">
+      <p15:sldGuideLst xmlns:p15="http://schemas.microsoft.com/office/powerpoint/2012/main"/>
+    </p:ext>
+  </p:extLst>
 </p:presentation>
 </file>
 
@@ -13831,15 +13836,7 @@
             </a:r>
             <a:r>
               <a:rPr dirty="0" err="1"/>
-              <a:t>embal</a:t>
-            </a:r>
-            <a:r>
-              <a:rPr dirty="0"/>
-              <a:t> </a:t>
-            </a:r>
-            <a:r>
-              <a:rPr dirty="0" err="1"/>
-              <a:t>amento</a:t>
+              <a:t>embalamento</a:t>
             </a:r>
             <a:r>
               <a:rPr dirty="0"/>

</xml_diff>

<commit_message>
Correção de erros na apresentação do programa; Dia da Defesa final
</commit_message>
<xml_diff>
--- a/Exame_T3_G4/Apresentacao_do_Programa.pptx
+++ b/Exame_T3_G4/Apresentacao_do_Programa.pptx
@@ -17528,6 +17528,36 @@
           <a:chExt cx="0" cy="0"/>
         </a:xfrm>
       </p:grpSpPr>
+      <p:pic>
+        <p:nvPicPr>
+          <p:cNvPr id="12" name="Imagem 11">
+            <a:extLst>
+              <a:ext uri="{FF2B5EF4-FFF2-40B4-BE49-F238E27FC236}">
+                <a16:creationId xmlns:a16="http://schemas.microsoft.com/office/drawing/2014/main" id="{413B7BA5-A3C5-FD0F-1412-A8E5C15E9443}"/>
+              </a:ext>
+            </a:extLst>
+          </p:cNvPr>
+          <p:cNvPicPr>
+            <a:picLocks noChangeAspect="1"/>
+          </p:cNvPicPr>
+          <p:nvPr/>
+        </p:nvPicPr>
+        <p:blipFill>
+          <a:blip r:embed="rId3"/>
+          <a:stretch>
+            <a:fillRect/>
+          </a:stretch>
+        </p:blipFill>
+        <p:spPr>
+          <a:xfrm>
+            <a:off x="1893665" y="1222901"/>
+            <a:ext cx="4010585" cy="3077004"/>
+          </a:xfrm>
+          <a:prstGeom prst="rect">
+            <a:avLst/>
+          </a:prstGeom>
+        </p:spPr>
+      </p:pic>
       <p:sp>
         <p:nvSpPr>
           <p:cNvPr id="878" name="Google Shape;878;p72">
@@ -17575,36 +17605,6 @@
           </a:p>
         </p:txBody>
       </p:sp>
-      <p:pic>
-        <p:nvPicPr>
-          <p:cNvPr id="3" name="Imagem 2">
-            <a:extLst>
-              <a:ext uri="{FF2B5EF4-FFF2-40B4-BE49-F238E27FC236}">
-                <a16:creationId xmlns:a16="http://schemas.microsoft.com/office/drawing/2014/main" id="{F087F901-9982-54ED-5B80-FFCA2C3C294C}"/>
-              </a:ext>
-            </a:extLst>
-          </p:cNvPr>
-          <p:cNvPicPr>
-            <a:picLocks noChangeAspect="1"/>
-          </p:cNvPicPr>
-          <p:nvPr/>
-        </p:nvPicPr>
-        <p:blipFill>
-          <a:blip r:embed="rId3"/>
-          <a:stretch>
-            <a:fillRect/>
-          </a:stretch>
-        </p:blipFill>
-        <p:spPr>
-          <a:xfrm>
-            <a:off x="2312824" y="1222901"/>
-            <a:ext cx="3591426" cy="3048425"/>
-          </a:xfrm>
-          <a:prstGeom prst="rect">
-            <a:avLst/>
-          </a:prstGeom>
-        </p:spPr>
-      </p:pic>
     </p:spTree>
     <p:extLst>
       <p:ext uri="{BB962C8B-B14F-4D97-AF65-F5344CB8AC3E}">

</xml_diff>